<commit_message>
Aula 7 - Deps and minio client
</commit_message>
<xml_diff>
--- a/doc/NUBOOT-MOD4-DEVOPS-SERVICES.pptx
+++ b/doc/NUBOOT-MOD4-DEVOPS-SERVICES.pptx
@@ -5,7 +5,7 @@
     <p:sldMasterId id="2147483648" r:id="rId1"/>
   </p:sldMasterIdLst>
   <p:notesMasterIdLst>
-    <p:notesMasterId r:id="rId28"/>
+    <p:notesMasterId r:id="rId34"/>
   </p:notesMasterIdLst>
   <p:sldIdLst>
     <p:sldId id="256" r:id="rId2"/>
@@ -34,6 +34,12 @@
     <p:sldId id="308" r:id="rId25"/>
     <p:sldId id="310" r:id="rId26"/>
     <p:sldId id="309" r:id="rId27"/>
+    <p:sldId id="311" r:id="rId28"/>
+    <p:sldId id="312" r:id="rId29"/>
+    <p:sldId id="313" r:id="rId30"/>
+    <p:sldId id="314" r:id="rId31"/>
+    <p:sldId id="315" r:id="rId32"/>
+    <p:sldId id="316" r:id="rId33"/>
   </p:sldIdLst>
   <p:sldSz cx="12192000" cy="6858000"/>
   <p:notesSz cx="6858000" cy="9144000"/>
@@ -187,10 +193,17 @@
         <p14:section name="Aula 6" id="{A4D5BACF-5B83-0548-A4EA-A43BAEAF772C}">
           <p14:sldIdLst>
             <p14:sldId id="309"/>
+            <p14:sldId id="311"/>
+            <p14:sldId id="312"/>
           </p14:sldIdLst>
         </p14:section>
         <p14:section name="Aula 7" id="{80ED8B7E-946E-934D-A436-51C4A223908B}">
-          <p14:sldIdLst/>
+          <p14:sldIdLst>
+            <p14:sldId id="313"/>
+            <p14:sldId id="314"/>
+            <p14:sldId id="315"/>
+            <p14:sldId id="316"/>
+          </p14:sldIdLst>
         </p14:section>
         <p14:section name="Aula 8" id="{E9A1ADAD-B9D2-2D4D-8E64-49DB59305D9C}">
           <p14:sldIdLst/>
@@ -286,7 +299,7 @@
           <a:p>
             <a:fld id="{290A6CB2-1C58-D84E-B07B-B5770D071A49}" type="datetimeFigureOut">
               <a:rPr lang="en-BR" smtClean="0"/>
-              <a:t>05/07/23</a:t>
+              <a:t>12/07/23</a:t>
             </a:fld>
             <a:endParaRPr lang="en-BR"/>
           </a:p>
@@ -855,7 +868,7 @@
           <a:p>
             <a:fld id="{9AB3A824-1A51-4B26-AD58-A6D8E14F6C04}" type="datetimeFigureOut">
               <a:rPr lang="en-US"/>
-              <a:t>7/5/23</a:t>
+              <a:t>7/12/23</a:t>
             </a:fld>
             <a:endParaRPr lang="en-US"/>
           </a:p>
@@ -1189,7 +1202,7 @@
           <a:p>
             <a:fld id="{D857E33E-8B18-4087-B112-809917729534}" type="datetimeFigureOut">
               <a:rPr lang="en-US"/>
-              <a:t>7/5/23</a:t>
+              <a:t>7/12/23</a:t>
             </a:fld>
             <a:endParaRPr lang="en-US"/>
           </a:p>
@@ -1491,7 +1504,7 @@
           <a:p>
             <a:fld id="{D3FFE419-2371-464F-8239-3959401C3561}" type="datetimeFigureOut">
               <a:rPr lang="en-US"/>
-              <a:t>7/5/23</a:t>
+              <a:t>7/12/23</a:t>
             </a:fld>
             <a:endParaRPr lang="en-US"/>
           </a:p>
@@ -1738,7 +1751,7 @@
           <a:p>
             <a:fld id="{97D162C4-EDD9-4389-A98B-B87ECEA2A816}" type="datetimeFigureOut">
               <a:rPr lang="en-US"/>
-              <a:t>7/5/23</a:t>
+              <a:t>7/12/23</a:t>
             </a:fld>
             <a:endParaRPr lang="en-US"/>
           </a:p>
@@ -2145,7 +2158,7 @@
           <a:p>
             <a:fld id="{3E5059C3-6A89-4494-99FF-5A4D6FFD50EB}" type="datetimeFigureOut">
               <a:rPr lang="en-US"/>
-              <a:t>7/5/23</a:t>
+              <a:t>7/12/23</a:t>
             </a:fld>
             <a:endParaRPr lang="en-US"/>
           </a:p>
@@ -2459,7 +2472,7 @@
           <a:p>
             <a:fld id="{CA954B2F-12DE-47F5-8894-472B206D2E1E}" type="datetimeFigureOut">
               <a:rPr lang="en-US"/>
-              <a:t>7/5/23</a:t>
+              <a:t>7/12/23</a:t>
             </a:fld>
             <a:endParaRPr lang="en-US"/>
           </a:p>
@@ -3003,7 +3016,7 @@
           <a:p>
             <a:fld id="{3F30E46F-7819-4ACF-B48B-48222C2ACC88}" type="datetimeFigureOut">
               <a:rPr lang="en-US"/>
-              <a:t>7/5/23</a:t>
+              <a:t>7/12/23</a:t>
             </a:fld>
             <a:endParaRPr lang="en-US"/>
           </a:p>
@@ -3198,7 +3211,7 @@
           <a:p>
             <a:fld id="{1FAF3416-4057-4DAA-829D-4CA07428D088}" type="datetimeFigureOut">
               <a:rPr lang="en-US"/>
-              <a:t>7/5/23</a:t>
+              <a:t>7/12/23</a:t>
             </a:fld>
             <a:endParaRPr lang="en-US"/>
           </a:p>
@@ -3411,7 +3424,7 @@
           <a:p>
             <a:fld id="{921D9284-D300-4297-87F7-E791DCC15DB1}" type="datetimeFigureOut">
               <a:rPr lang="en-US"/>
-              <a:t>7/5/23</a:t>
+              <a:t>7/12/23</a:t>
             </a:fld>
             <a:endParaRPr lang="en-US"/>
           </a:p>
@@ -3780,7 +3793,7 @@
           <a:p>
             <a:fld id="{37D525BB-DA17-4BA0-B3C8-3AC3ABC827E6}" type="datetimeFigureOut">
               <a:rPr lang="en-US"/>
-              <a:t>7/5/23</a:t>
+              <a:t>7/12/23</a:t>
             </a:fld>
             <a:endParaRPr lang="en-US"/>
           </a:p>
@@ -4182,7 +4195,7 @@
           <a:p>
             <a:fld id="{B16C4C9A-3960-41CF-A4E9-2A8FB932454B}" type="datetimeFigureOut">
               <a:rPr lang="en-US"/>
-              <a:t>7/5/23</a:t>
+              <a:t>7/12/23</a:t>
             </a:fld>
             <a:endParaRPr lang="en-US"/>
           </a:p>
@@ -4493,7 +4506,7 @@
           <a:p>
             <a:fld id="{3CBC1C18-307B-4F68-A007-B5B542270E8D}" type="datetimeFigureOut">
               <a:rPr lang="en-US"/>
-              <a:t>7/5/23</a:t>
+              <a:t>7/12/23</a:t>
             </a:fld>
             <a:endParaRPr lang="en-US"/>
           </a:p>
@@ -8380,13 +8393,13 @@
           <a:p>
             <a:r>
               <a:rPr lang="en-BR" dirty="0"/>
+              <a:t>Rate Limiting</a:t>
+            </a:r>
+          </a:p>
+          <a:p>
+            <a:r>
+              <a:rPr lang="en-BR" dirty="0"/>
               <a:t>Session</a:t>
-            </a:r>
-          </a:p>
-          <a:p>
-            <a:r>
-              <a:rPr lang="en-BR" dirty="0"/>
-              <a:t>Rate Limiting</a:t>
             </a:r>
           </a:p>
           <a:p>
@@ -8401,6 +8414,574 @@
     <p:extLst>
       <p:ext uri="{BB962C8B-B14F-4D97-AF65-F5344CB8AC3E}">
         <p14:creationId xmlns:p14="http://schemas.microsoft.com/office/powerpoint/2010/main" val="3855983324"/>
+      </p:ext>
+    </p:extLst>
+  </p:cSld>
+  <p:clrMapOvr>
+    <a:masterClrMapping/>
+  </p:clrMapOvr>
+</p:sld>
+</file>
+
+<file path=ppt/slides/slide27.xml><?xml version="1.0" encoding="utf-8"?>
+<p:sld xmlns:a="http://schemas.openxmlformats.org/drawingml/2006/main" xmlns:r="http://schemas.openxmlformats.org/officeDocument/2006/relationships" xmlns:p="http://schemas.openxmlformats.org/presentationml/2006/main">
+  <p:cSld>
+    <p:spTree>
+      <p:nvGrpSpPr>
+        <p:cNvPr id="1" name=""/>
+        <p:cNvGrpSpPr/>
+        <p:nvPr/>
+      </p:nvGrpSpPr>
+      <p:grpSpPr>
+        <a:xfrm>
+          <a:off x="0" y="0"/>
+          <a:ext cx="0" cy="0"/>
+          <a:chOff x="0" y="0"/>
+          <a:chExt cx="0" cy="0"/>
+        </a:xfrm>
+      </p:grpSpPr>
+      <p:sp>
+        <p:nvSpPr>
+          <p:cNvPr id="2" name="Title 1">
+            <a:extLst>
+              <a:ext uri="{FF2B5EF4-FFF2-40B4-BE49-F238E27FC236}">
+                <a16:creationId xmlns:a16="http://schemas.microsoft.com/office/drawing/2014/main" id="{E13A58F9-5077-E4DA-B943-3053A2D31716}"/>
+              </a:ext>
+            </a:extLst>
+          </p:cNvPr>
+          <p:cNvSpPr>
+            <a:spLocks noGrp="1"/>
+          </p:cNvSpPr>
+          <p:nvPr>
+            <p:ph type="title"/>
+          </p:nvPr>
+        </p:nvSpPr>
+        <p:spPr/>
+        <p:txBody>
+          <a:bodyPr/>
+          <a:lstStyle/>
+          <a:p>
+            <a:r>
+              <a:rPr lang="en-BR" dirty="0"/>
+              <a:t>Exercicios	</a:t>
+            </a:r>
+          </a:p>
+        </p:txBody>
+      </p:sp>
+      <p:sp>
+        <p:nvSpPr>
+          <p:cNvPr id="3" name="Content Placeholder 2">
+            <a:extLst>
+              <a:ext uri="{FF2B5EF4-FFF2-40B4-BE49-F238E27FC236}">
+                <a16:creationId xmlns:a16="http://schemas.microsoft.com/office/drawing/2014/main" id="{CF8A0263-07CE-4C07-4C5C-D0D50FBD028D}"/>
+              </a:ext>
+            </a:extLst>
+          </p:cNvPr>
+          <p:cNvSpPr>
+            <a:spLocks noGrp="1"/>
+          </p:cNvSpPr>
+          <p:nvPr>
+            <p:ph idx="1"/>
+          </p:nvPr>
+        </p:nvSpPr>
+        <p:spPr/>
+        <p:txBody>
+          <a:bodyPr/>
+          <a:lstStyle/>
+          <a:p>
+            <a:r>
+              <a:rPr lang="en-BR" dirty="0"/>
+              <a:t>Alterar o contador do rate-limit para:</a:t>
+            </a:r>
+          </a:p>
+          <a:p>
+            <a:r>
+              <a:rPr lang="en-BR" dirty="0"/>
+              <a:t>Uso do IP de origem do cliente (</a:t>
+            </a:r>
+            <a:r>
+              <a:rPr lang="en-US" dirty="0">
+                <a:hlinkClick r:id="rId2"/>
+              </a:rPr>
+              <a:t>http://pedestal.io/reference/context-map)</a:t>
+            </a:r>
+            <a:endParaRPr lang="en-US" dirty="0"/>
+          </a:p>
+          <a:p>
+            <a:r>
+              <a:rPr lang="en-US" dirty="0" err="1"/>
+              <a:t>Janela</a:t>
+            </a:r>
+            <a:r>
+              <a:rPr lang="en-US" dirty="0"/>
+              <a:t> de tempo </a:t>
+            </a:r>
+            <a:r>
+              <a:rPr lang="en-US" dirty="0" err="1"/>
+              <a:t>configurável</a:t>
+            </a:r>
+            <a:r>
+              <a:rPr lang="en-US" dirty="0"/>
+              <a:t> </a:t>
+            </a:r>
+            <a:r>
+              <a:rPr lang="en-US" dirty="0" err="1"/>
+              <a:t>em</a:t>
+            </a:r>
+            <a:r>
+              <a:rPr lang="en-US" dirty="0"/>
+              <a:t> </a:t>
+            </a:r>
+            <a:r>
+              <a:rPr lang="en-US" dirty="0" err="1"/>
+              <a:t>segundos</a:t>
+            </a:r>
+            <a:endParaRPr lang="en-US" dirty="0"/>
+          </a:p>
+          <a:p>
+            <a:endParaRPr lang="en-BR" dirty="0"/>
+          </a:p>
+        </p:txBody>
+      </p:sp>
+    </p:spTree>
+    <p:extLst>
+      <p:ext uri="{BB962C8B-B14F-4D97-AF65-F5344CB8AC3E}">
+        <p14:creationId xmlns:p14="http://schemas.microsoft.com/office/powerpoint/2010/main" val="3578827432"/>
+      </p:ext>
+    </p:extLst>
+  </p:cSld>
+  <p:clrMapOvr>
+    <a:masterClrMapping/>
+  </p:clrMapOvr>
+</p:sld>
+</file>
+
+<file path=ppt/slides/slide28.xml><?xml version="1.0" encoding="utf-8"?>
+<p:sld xmlns:a="http://schemas.openxmlformats.org/drawingml/2006/main" xmlns:r="http://schemas.openxmlformats.org/officeDocument/2006/relationships" xmlns:p="http://schemas.openxmlformats.org/presentationml/2006/main">
+  <p:cSld>
+    <p:spTree>
+      <p:nvGrpSpPr>
+        <p:cNvPr id="1" name=""/>
+        <p:cNvGrpSpPr/>
+        <p:nvPr/>
+      </p:nvGrpSpPr>
+      <p:grpSpPr>
+        <a:xfrm>
+          <a:off x="0" y="0"/>
+          <a:ext cx="0" cy="0"/>
+          <a:chOff x="0" y="0"/>
+          <a:chExt cx="0" cy="0"/>
+        </a:xfrm>
+      </p:grpSpPr>
+      <p:sp>
+        <p:nvSpPr>
+          <p:cNvPr id="2" name="Title 1">
+            <a:extLst>
+              <a:ext uri="{FF2B5EF4-FFF2-40B4-BE49-F238E27FC236}">
+                <a16:creationId xmlns:a16="http://schemas.microsoft.com/office/drawing/2014/main" id="{E13A58F9-5077-E4DA-B943-3053A2D31716}"/>
+              </a:ext>
+            </a:extLst>
+          </p:cNvPr>
+          <p:cNvSpPr>
+            <a:spLocks noGrp="1"/>
+          </p:cNvSpPr>
+          <p:nvPr>
+            <p:ph type="title"/>
+          </p:nvPr>
+        </p:nvSpPr>
+        <p:spPr/>
+        <p:txBody>
+          <a:bodyPr/>
+          <a:lstStyle/>
+          <a:p>
+            <a:r>
+              <a:rPr lang="en-BR" dirty="0"/>
+              <a:t>Exercicios	</a:t>
+            </a:r>
+          </a:p>
+        </p:txBody>
+      </p:sp>
+      <p:sp>
+        <p:nvSpPr>
+          <p:cNvPr id="3" name="Content Placeholder 2">
+            <a:extLst>
+              <a:ext uri="{FF2B5EF4-FFF2-40B4-BE49-F238E27FC236}">
+                <a16:creationId xmlns:a16="http://schemas.microsoft.com/office/drawing/2014/main" id="{CF8A0263-07CE-4C07-4C5C-D0D50FBD028D}"/>
+              </a:ext>
+            </a:extLst>
+          </p:cNvPr>
+          <p:cNvSpPr>
+            <a:spLocks noGrp="1"/>
+          </p:cNvSpPr>
+          <p:nvPr>
+            <p:ph idx="1"/>
+          </p:nvPr>
+        </p:nvSpPr>
+        <p:spPr/>
+        <p:txBody>
+          <a:bodyPr>
+            <a:normAutofit fontScale="92500" lnSpcReduction="20000"/>
+          </a:bodyPr>
+          <a:lstStyle/>
+          <a:p>
+            <a:r>
+              <a:rPr lang="en-BR" dirty="0"/>
+              <a:t>Alterar o session para:</a:t>
+            </a:r>
+          </a:p>
+          <a:p>
+            <a:r>
+              <a:rPr lang="en-BR" dirty="0"/>
+              <a:t>Uso do redis para guardar usuários, inicialização da key deve ser junto com start do serviço.</a:t>
+            </a:r>
+          </a:p>
+          <a:p>
+            <a:r>
+              <a:rPr lang="en-US" dirty="0" err="1"/>
+              <a:t>Permitir</a:t>
+            </a:r>
+            <a:r>
+              <a:rPr lang="en-US" dirty="0"/>
+              <a:t> </a:t>
+            </a:r>
+            <a:r>
+              <a:rPr lang="en-US" dirty="0" err="1"/>
+              <a:t>configurar</a:t>
+            </a:r>
+            <a:r>
+              <a:rPr lang="en-US" dirty="0"/>
+              <a:t> tempo de </a:t>
+            </a:r>
+            <a:r>
+              <a:rPr lang="en-US" dirty="0" err="1"/>
+              <a:t>duração</a:t>
+            </a:r>
+            <a:r>
+              <a:rPr lang="en-US" dirty="0"/>
+              <a:t> da </a:t>
+            </a:r>
+            <a:r>
+              <a:rPr lang="en-US" dirty="0" err="1"/>
+              <a:t>sessão</a:t>
+            </a:r>
+            <a:r>
+              <a:rPr lang="en-US" dirty="0"/>
+              <a:t> de </a:t>
+            </a:r>
+            <a:r>
+              <a:rPr lang="en-US" dirty="0" err="1"/>
+              <a:t>acordo</a:t>
+            </a:r>
+            <a:r>
+              <a:rPr lang="en-US" dirty="0"/>
+              <a:t> com </a:t>
+            </a:r>
+            <a:r>
+              <a:rPr lang="en-US" dirty="0" err="1"/>
+              <a:t>tipo</a:t>
+            </a:r>
+            <a:r>
+              <a:rPr lang="en-US" dirty="0"/>
+              <a:t> de </a:t>
+            </a:r>
+            <a:r>
+              <a:rPr lang="en-US" dirty="0" err="1"/>
+              <a:t>usuário</a:t>
+            </a:r>
+            <a:r>
+              <a:rPr lang="en-US" dirty="0"/>
+              <a:t> (‘admin’ 12 horas </a:t>
+            </a:r>
+            <a:r>
+              <a:rPr lang="en-US" dirty="0" err="1"/>
+              <a:t>ou</a:t>
+            </a:r>
+            <a:r>
+              <a:rPr lang="en-US" dirty="0"/>
+              <a:t> ‘regular’ 3 horas)</a:t>
+            </a:r>
+          </a:p>
+          <a:p>
+            <a:r>
+              <a:rPr lang="en-US" dirty="0" err="1"/>
+              <a:t>Implementar</a:t>
+            </a:r>
+            <a:r>
+              <a:rPr lang="en-US" dirty="0"/>
+              <a:t> endpoints de </a:t>
+            </a:r>
+            <a:r>
+              <a:rPr lang="en-US" dirty="0" err="1"/>
+              <a:t>criação</a:t>
+            </a:r>
+            <a:r>
+              <a:rPr lang="en-US" dirty="0"/>
+              <a:t> de </a:t>
+            </a:r>
+            <a:r>
+              <a:rPr lang="en-US" dirty="0" err="1"/>
+              <a:t>usuário</a:t>
+            </a:r>
+            <a:r>
+              <a:rPr lang="en-US" dirty="0"/>
+              <a:t> </a:t>
+            </a:r>
+            <a:r>
+              <a:rPr lang="en-US" dirty="0" err="1"/>
+              <a:t>temporário</a:t>
+            </a:r>
+            <a:r>
+              <a:rPr lang="en-US" dirty="0"/>
+              <a:t>.</a:t>
+            </a:r>
+          </a:p>
+          <a:p>
+            <a:r>
+              <a:rPr lang="en-US" dirty="0" err="1"/>
+              <a:t>Receber</a:t>
+            </a:r>
+            <a:r>
+              <a:rPr lang="en-US" dirty="0"/>
+              <a:t> </a:t>
+            </a:r>
+            <a:r>
+              <a:rPr lang="en-US" dirty="0" err="1"/>
+              <a:t>usuário</a:t>
+            </a:r>
+            <a:r>
+              <a:rPr lang="en-US" dirty="0"/>
+              <a:t> </a:t>
+            </a:r>
+            <a:r>
+              <a:rPr lang="en-US" dirty="0" err="1"/>
+              <a:t>em</a:t>
+            </a:r>
+            <a:r>
+              <a:rPr lang="en-US" dirty="0"/>
+              <a:t> um endpoint e </a:t>
+            </a:r>
+            <a:r>
+              <a:rPr lang="en-US" dirty="0" err="1"/>
+              <a:t>senha</a:t>
+            </a:r>
+            <a:r>
+              <a:rPr lang="en-US" dirty="0"/>
+              <a:t> </a:t>
+            </a:r>
+            <a:r>
+              <a:rPr lang="en-US" dirty="0" err="1"/>
+              <a:t>em</a:t>
+            </a:r>
+            <a:r>
+              <a:rPr lang="en-US" dirty="0"/>
+              <a:t> outro (</a:t>
+            </a:r>
+            <a:r>
+              <a:rPr lang="en-US" dirty="0" err="1"/>
+              <a:t>adicionar</a:t>
+            </a:r>
+            <a:r>
+              <a:rPr lang="en-US" dirty="0"/>
+              <a:t> no </a:t>
+            </a:r>
+            <a:r>
+              <a:rPr lang="en-US" dirty="0" err="1"/>
+              <a:t>redis</a:t>
+            </a:r>
+            <a:r>
+              <a:rPr lang="en-US" dirty="0"/>
+              <a:t> com </a:t>
+            </a:r>
+            <a:r>
+              <a:rPr lang="en-US" dirty="0" err="1"/>
+              <a:t>expiração</a:t>
+            </a:r>
+            <a:r>
+              <a:rPr lang="en-US" dirty="0"/>
+              <a:t> de 3 </a:t>
+            </a:r>
+            <a:r>
+              <a:rPr lang="en-US" dirty="0" err="1"/>
+              <a:t>minutos</a:t>
+            </a:r>
+            <a:r>
+              <a:rPr lang="en-US" dirty="0"/>
+              <a:t>). </a:t>
+            </a:r>
+          </a:p>
+          <a:p>
+            <a:r>
+              <a:rPr lang="en-US" dirty="0" err="1"/>
+              <a:t>Testar</a:t>
+            </a:r>
+            <a:r>
+              <a:rPr lang="en-US" dirty="0"/>
+              <a:t> </a:t>
+            </a:r>
+            <a:r>
+              <a:rPr lang="en-US" dirty="0" err="1"/>
+              <a:t>sessão</a:t>
+            </a:r>
+            <a:r>
+              <a:rPr lang="en-US" dirty="0"/>
+              <a:t> com o </a:t>
+            </a:r>
+            <a:r>
+              <a:rPr lang="en-US" dirty="0" err="1"/>
+              <a:t>usuário</a:t>
+            </a:r>
+            <a:r>
+              <a:rPr lang="en-US" dirty="0"/>
+              <a:t> </a:t>
+            </a:r>
+            <a:r>
+              <a:rPr lang="en-US" dirty="0" err="1"/>
+              <a:t>criado</a:t>
+            </a:r>
+            <a:r>
+              <a:rPr lang="en-US" dirty="0"/>
+              <a:t>.</a:t>
+            </a:r>
+          </a:p>
+          <a:p>
+            <a:endParaRPr lang="en-BR" dirty="0"/>
+          </a:p>
+        </p:txBody>
+      </p:sp>
+    </p:spTree>
+    <p:extLst>
+      <p:ext uri="{BB962C8B-B14F-4D97-AF65-F5344CB8AC3E}">
+        <p14:creationId xmlns:p14="http://schemas.microsoft.com/office/powerpoint/2010/main" val="4024840645"/>
+      </p:ext>
+    </p:extLst>
+  </p:cSld>
+  <p:clrMapOvr>
+    <a:masterClrMapping/>
+  </p:clrMapOvr>
+</p:sld>
+</file>
+
+<file path=ppt/slides/slide29.xml><?xml version="1.0" encoding="utf-8"?>
+<p:sld xmlns:a="http://schemas.openxmlformats.org/drawingml/2006/main" xmlns:r="http://schemas.openxmlformats.org/officeDocument/2006/relationships" xmlns:p="http://schemas.openxmlformats.org/presentationml/2006/main">
+  <p:cSld>
+    <p:spTree>
+      <p:nvGrpSpPr>
+        <p:cNvPr id="1" name=""/>
+        <p:cNvGrpSpPr/>
+        <p:nvPr/>
+      </p:nvGrpSpPr>
+      <p:grpSpPr>
+        <a:xfrm>
+          <a:off x="0" y="0"/>
+          <a:ext cx="0" cy="0"/>
+          <a:chOff x="0" y="0"/>
+          <a:chExt cx="0" cy="0"/>
+        </a:xfrm>
+      </p:grpSpPr>
+      <p:sp>
+        <p:nvSpPr>
+          <p:cNvPr id="2" name="Title 1">
+            <a:extLst>
+              <a:ext uri="{FF2B5EF4-FFF2-40B4-BE49-F238E27FC236}">
+                <a16:creationId xmlns:a16="http://schemas.microsoft.com/office/drawing/2014/main" id="{DEC72F72-42F9-57D1-B117-E8EA3E4C6321}"/>
+              </a:ext>
+            </a:extLst>
+          </p:cNvPr>
+          <p:cNvSpPr>
+            <a:spLocks noGrp="1"/>
+          </p:cNvSpPr>
+          <p:nvPr>
+            <p:ph type="title"/>
+          </p:nvPr>
+        </p:nvSpPr>
+        <p:spPr>
+          <a:xfrm>
+            <a:off x="2611808" y="808056"/>
+            <a:ext cx="7958331" cy="1986419"/>
+          </a:xfrm>
+        </p:spPr>
+        <p:txBody>
+          <a:bodyPr>
+            <a:normAutofit/>
+          </a:bodyPr>
+          <a:lstStyle/>
+          <a:p>
+            <a:r>
+              <a:rPr lang="en-US" dirty="0"/>
+              <a:t>DevOps – Cloud Services</a:t>
+            </a:r>
+            <a:br>
+              <a:rPr lang="en-BR" dirty="0"/>
+            </a:br>
+            <a:r>
+              <a:rPr lang="en-BR" dirty="0"/>
+              <a:t>Aula 7 – //2023</a:t>
+            </a:r>
+            <a:br>
+              <a:rPr lang="en-BR" dirty="0"/>
+            </a:br>
+            <a:r>
+              <a:rPr lang="en-BR" dirty="0"/>
+              <a:t>@victorinacio	</a:t>
+            </a:r>
+          </a:p>
+        </p:txBody>
+      </p:sp>
+      <p:sp>
+        <p:nvSpPr>
+          <p:cNvPr id="5" name="Content Placeholder 4">
+            <a:extLst>
+              <a:ext uri="{FF2B5EF4-FFF2-40B4-BE49-F238E27FC236}">
+                <a16:creationId xmlns:a16="http://schemas.microsoft.com/office/drawing/2014/main" id="{70A87C15-BA2A-E799-E2AF-0BE35BE7FD7A}"/>
+              </a:ext>
+            </a:extLst>
+          </p:cNvPr>
+          <p:cNvSpPr>
+            <a:spLocks noGrp="1"/>
+          </p:cNvSpPr>
+          <p:nvPr>
+            <p:ph idx="1"/>
+          </p:nvPr>
+        </p:nvSpPr>
+        <p:spPr>
+          <a:xfrm>
+            <a:off x="2773599" y="2282024"/>
+            <a:ext cx="7796540" cy="3767920"/>
+          </a:xfrm>
+        </p:spPr>
+        <p:txBody>
+          <a:bodyPr/>
+          <a:lstStyle/>
+          <a:p>
+            <a:r>
+              <a:rPr lang="en-BR" dirty="0"/>
+              <a:t>Object Storage</a:t>
+            </a:r>
+          </a:p>
+          <a:p>
+            <a:r>
+              <a:rPr lang="en-BR" dirty="0"/>
+              <a:t>Minio</a:t>
+            </a:r>
+          </a:p>
+          <a:p>
+            <a:r>
+              <a:rPr lang="en-BR" dirty="0"/>
+              <a:t>API Clojure</a:t>
+            </a:r>
+          </a:p>
+          <a:p>
+            <a:endParaRPr lang="en-BR" dirty="0"/>
+          </a:p>
+          <a:p>
+            <a:endParaRPr lang="en-BR" dirty="0"/>
+          </a:p>
+        </p:txBody>
+      </p:sp>
+    </p:spTree>
+    <p:extLst>
+      <p:ext uri="{BB962C8B-B14F-4D97-AF65-F5344CB8AC3E}">
+        <p14:creationId xmlns:p14="http://schemas.microsoft.com/office/powerpoint/2010/main" val="2171009379"/>
       </p:ext>
     </p:extLst>
   </p:cSld>
@@ -8478,6 +9059,328 @@
     <p:extLst>
       <p:ext uri="{BB962C8B-B14F-4D97-AF65-F5344CB8AC3E}">
         <p14:creationId xmlns:p14="http://schemas.microsoft.com/office/powerpoint/2010/main" val="3191841740"/>
+      </p:ext>
+    </p:extLst>
+  </p:cSld>
+  <p:clrMapOvr>
+    <a:masterClrMapping/>
+  </p:clrMapOvr>
+</p:sld>
+</file>
+
+<file path=ppt/slides/slide30.xml><?xml version="1.0" encoding="utf-8"?>
+<p:sld xmlns:a="http://schemas.openxmlformats.org/drawingml/2006/main" xmlns:r="http://schemas.openxmlformats.org/officeDocument/2006/relationships" xmlns:p="http://schemas.openxmlformats.org/presentationml/2006/main">
+  <p:cSld>
+    <p:spTree>
+      <p:nvGrpSpPr>
+        <p:cNvPr id="1" name=""/>
+        <p:cNvGrpSpPr/>
+        <p:nvPr/>
+      </p:nvGrpSpPr>
+      <p:grpSpPr>
+        <a:xfrm>
+          <a:off x="0" y="0"/>
+          <a:ext cx="0" cy="0"/>
+          <a:chOff x="0" y="0"/>
+          <a:chExt cx="0" cy="0"/>
+        </a:xfrm>
+      </p:grpSpPr>
+      <p:sp>
+        <p:nvSpPr>
+          <p:cNvPr id="2" name="Title 1">
+            <a:extLst>
+              <a:ext uri="{FF2B5EF4-FFF2-40B4-BE49-F238E27FC236}">
+                <a16:creationId xmlns:a16="http://schemas.microsoft.com/office/drawing/2014/main" id="{8D58C6B4-03B0-320E-D3E0-1B5993921342}"/>
+              </a:ext>
+            </a:extLst>
+          </p:cNvPr>
+          <p:cNvSpPr>
+            <a:spLocks noGrp="1"/>
+          </p:cNvSpPr>
+          <p:nvPr>
+            <p:ph type="title"/>
+          </p:nvPr>
+        </p:nvSpPr>
+        <p:spPr/>
+        <p:txBody>
+          <a:bodyPr/>
+          <a:lstStyle/>
+          <a:p>
+            <a:r>
+              <a:rPr lang="en-BR" dirty="0"/>
+              <a:t>Object Storage</a:t>
+            </a:r>
+          </a:p>
+        </p:txBody>
+      </p:sp>
+      <p:sp>
+        <p:nvSpPr>
+          <p:cNvPr id="3" name="Content Placeholder 2">
+            <a:extLst>
+              <a:ext uri="{FF2B5EF4-FFF2-40B4-BE49-F238E27FC236}">
+                <a16:creationId xmlns:a16="http://schemas.microsoft.com/office/drawing/2014/main" id="{44A1258A-DAAB-0DAD-CA6C-0243A6F4C6AF}"/>
+              </a:ext>
+            </a:extLst>
+          </p:cNvPr>
+          <p:cNvSpPr>
+            <a:spLocks noGrp="1"/>
+          </p:cNvSpPr>
+          <p:nvPr>
+            <p:ph idx="1"/>
+          </p:nvPr>
+        </p:nvSpPr>
+        <p:spPr/>
+        <p:txBody>
+          <a:bodyPr/>
+          <a:lstStyle/>
+          <a:p>
+            <a:r>
+              <a:rPr lang="en-BR" dirty="0"/>
+              <a:t>BLOB – Binary Large O</a:t>
+            </a:r>
+            <a:r>
+              <a:rPr lang="en-US" dirty="0"/>
+              <a:t>b</a:t>
+            </a:r>
+            <a:r>
+              <a:rPr lang="en-BR" dirty="0"/>
+              <a:t>ject</a:t>
+            </a:r>
+          </a:p>
+          <a:p>
+            <a:r>
+              <a:rPr lang="en-BR" dirty="0"/>
+              <a:t>Documentos Texto, Imagens, PDF, Videos, Executaveis</a:t>
+            </a:r>
+          </a:p>
+        </p:txBody>
+      </p:sp>
+    </p:spTree>
+    <p:extLst>
+      <p:ext uri="{BB962C8B-B14F-4D97-AF65-F5344CB8AC3E}">
+        <p14:creationId xmlns:p14="http://schemas.microsoft.com/office/powerpoint/2010/main" val="2807825329"/>
+      </p:ext>
+    </p:extLst>
+  </p:cSld>
+  <p:clrMapOvr>
+    <a:masterClrMapping/>
+  </p:clrMapOvr>
+</p:sld>
+</file>
+
+<file path=ppt/slides/slide31.xml><?xml version="1.0" encoding="utf-8"?>
+<p:sld xmlns:a="http://schemas.openxmlformats.org/drawingml/2006/main" xmlns:r="http://schemas.openxmlformats.org/officeDocument/2006/relationships" xmlns:p="http://schemas.openxmlformats.org/presentationml/2006/main">
+  <p:cSld>
+    <p:spTree>
+      <p:nvGrpSpPr>
+        <p:cNvPr id="1" name=""/>
+        <p:cNvGrpSpPr/>
+        <p:nvPr/>
+      </p:nvGrpSpPr>
+      <p:grpSpPr>
+        <a:xfrm>
+          <a:off x="0" y="0"/>
+          <a:ext cx="0" cy="0"/>
+          <a:chOff x="0" y="0"/>
+          <a:chExt cx="0" cy="0"/>
+        </a:xfrm>
+      </p:grpSpPr>
+      <p:sp>
+        <p:nvSpPr>
+          <p:cNvPr id="2" name="Title 1">
+            <a:extLst>
+              <a:ext uri="{FF2B5EF4-FFF2-40B4-BE49-F238E27FC236}">
+                <a16:creationId xmlns:a16="http://schemas.microsoft.com/office/drawing/2014/main" id="{CC31A422-00A6-F19A-ACA6-F38F1FE60E98}"/>
+              </a:ext>
+            </a:extLst>
+          </p:cNvPr>
+          <p:cNvSpPr>
+            <a:spLocks noGrp="1"/>
+          </p:cNvSpPr>
+          <p:nvPr>
+            <p:ph type="title"/>
+          </p:nvPr>
+        </p:nvSpPr>
+        <p:spPr/>
+        <p:txBody>
+          <a:bodyPr/>
+          <a:lstStyle/>
+          <a:p>
+            <a:r>
+              <a:rPr lang="en-BR" dirty="0"/>
+              <a:t>Bucket</a:t>
+            </a:r>
+          </a:p>
+        </p:txBody>
+      </p:sp>
+      <p:sp>
+        <p:nvSpPr>
+          <p:cNvPr id="3" name="Content Placeholder 2">
+            <a:extLst>
+              <a:ext uri="{FF2B5EF4-FFF2-40B4-BE49-F238E27FC236}">
+                <a16:creationId xmlns:a16="http://schemas.microsoft.com/office/drawing/2014/main" id="{40B5E96E-1073-0351-1618-347A05C61FE9}"/>
+              </a:ext>
+            </a:extLst>
+          </p:cNvPr>
+          <p:cNvSpPr>
+            <a:spLocks noGrp="1"/>
+          </p:cNvSpPr>
+          <p:nvPr>
+            <p:ph idx="1"/>
+          </p:nvPr>
+        </p:nvSpPr>
+        <p:spPr/>
+        <p:txBody>
+          <a:bodyPr/>
+          <a:lstStyle/>
+          <a:p>
+            <a:r>
+              <a:rPr lang="en-BR" dirty="0"/>
+              <a:t>Mount de Disco - HD</a:t>
+            </a:r>
+          </a:p>
+          <a:p>
+            <a:r>
+              <a:rPr lang="en-BR" dirty="0"/>
+              <a:t>Database</a:t>
+            </a:r>
+          </a:p>
+          <a:p>
+            <a:r>
+              <a:rPr lang="en-BR" dirty="0"/>
+              <a:t>Hierarquia de prefixos (pasta / diretório)</a:t>
+            </a:r>
+          </a:p>
+        </p:txBody>
+      </p:sp>
+    </p:spTree>
+    <p:extLst>
+      <p:ext uri="{BB962C8B-B14F-4D97-AF65-F5344CB8AC3E}">
+        <p14:creationId xmlns:p14="http://schemas.microsoft.com/office/powerpoint/2010/main" val="763053354"/>
+      </p:ext>
+    </p:extLst>
+  </p:cSld>
+  <p:clrMapOvr>
+    <a:masterClrMapping/>
+  </p:clrMapOvr>
+</p:sld>
+</file>
+
+<file path=ppt/slides/slide32.xml><?xml version="1.0" encoding="utf-8"?>
+<p:sld xmlns:a="http://schemas.openxmlformats.org/drawingml/2006/main" xmlns:r="http://schemas.openxmlformats.org/officeDocument/2006/relationships" xmlns:p="http://schemas.openxmlformats.org/presentationml/2006/main">
+  <p:cSld>
+    <p:spTree>
+      <p:nvGrpSpPr>
+        <p:cNvPr id="1" name=""/>
+        <p:cNvGrpSpPr/>
+        <p:nvPr/>
+      </p:nvGrpSpPr>
+      <p:grpSpPr>
+        <a:xfrm>
+          <a:off x="0" y="0"/>
+          <a:ext cx="0" cy="0"/>
+          <a:chOff x="0" y="0"/>
+          <a:chExt cx="0" cy="0"/>
+        </a:xfrm>
+      </p:grpSpPr>
+      <p:sp>
+        <p:nvSpPr>
+          <p:cNvPr id="2" name="Title 1">
+            <a:extLst>
+              <a:ext uri="{FF2B5EF4-FFF2-40B4-BE49-F238E27FC236}">
+                <a16:creationId xmlns:a16="http://schemas.microsoft.com/office/drawing/2014/main" id="{C705731D-161B-F5E6-B6F1-714A539474F3}"/>
+              </a:ext>
+            </a:extLst>
+          </p:cNvPr>
+          <p:cNvSpPr>
+            <a:spLocks noGrp="1"/>
+          </p:cNvSpPr>
+          <p:nvPr>
+            <p:ph type="title"/>
+          </p:nvPr>
+        </p:nvSpPr>
+        <p:spPr/>
+        <p:txBody>
+          <a:bodyPr/>
+          <a:lstStyle/>
+          <a:p>
+            <a:r>
+              <a:rPr lang="en-BR" dirty="0"/>
+              <a:t>Exercicios</a:t>
+            </a:r>
+          </a:p>
+        </p:txBody>
+      </p:sp>
+      <p:sp>
+        <p:nvSpPr>
+          <p:cNvPr id="3" name="Content Placeholder 2">
+            <a:extLst>
+              <a:ext uri="{FF2B5EF4-FFF2-40B4-BE49-F238E27FC236}">
+                <a16:creationId xmlns:a16="http://schemas.microsoft.com/office/drawing/2014/main" id="{1255754F-CB02-0E77-FEBC-1786F413BA59}"/>
+              </a:ext>
+            </a:extLst>
+          </p:cNvPr>
+          <p:cNvSpPr>
+            <a:spLocks noGrp="1"/>
+          </p:cNvSpPr>
+          <p:nvPr>
+            <p:ph idx="1"/>
+          </p:nvPr>
+        </p:nvSpPr>
+        <p:spPr/>
+        <p:txBody>
+          <a:bodyPr>
+            <a:normAutofit fontScale="92500" lnSpcReduction="20000"/>
+          </a:bodyPr>
+          <a:lstStyle/>
+          <a:p>
+            <a:r>
+              <a:rPr lang="en-BR" dirty="0"/>
+              <a:t>Preparar uma demonstração do MinIO com as seguintes atividades.</a:t>
+            </a:r>
+          </a:p>
+          <a:p>
+            <a:r>
+              <a:rPr lang="en-BR" dirty="0"/>
+              <a:t>1 – Criar Bucket via GUI e outro via API</a:t>
+            </a:r>
+          </a:p>
+          <a:p>
+            <a:r>
+              <a:rPr lang="en-BR" dirty="0"/>
+              <a:t>2 – Upload de Arquivo txt via GUI e via API</a:t>
+            </a:r>
+          </a:p>
+          <a:p>
+            <a:r>
+              <a:rPr lang="en-BR" dirty="0"/>
+              <a:t>3 – Imprimir conteudo de arquivo via API e Clojure</a:t>
+            </a:r>
+          </a:p>
+          <a:p>
+            <a:r>
+              <a:rPr lang="en-BR" dirty="0"/>
+              <a:t>4 – Listar arquivos em todos os buckets de um server via API</a:t>
+            </a:r>
+          </a:p>
+          <a:p>
+            <a:r>
+              <a:rPr lang="en-BR" dirty="0"/>
+              <a:t>5 – Gerar URL via API e baixar arquivo via Browser</a:t>
+            </a:r>
+          </a:p>
+          <a:p>
+            <a:r>
+              <a:rPr lang="en-BR" dirty="0"/>
+              <a:t>6 – Criar endpoint para receber string com usuario e senha e salvar arquivo com a senha HASHEADA</a:t>
+            </a:r>
+          </a:p>
+        </p:txBody>
+      </p:sp>
+    </p:spTree>
+    <p:extLst>
+      <p:ext uri="{BB962C8B-B14F-4D97-AF65-F5344CB8AC3E}">
+        <p14:creationId xmlns:p14="http://schemas.microsoft.com/office/powerpoint/2010/main" val="3244142063"/>
       </p:ext>
     </p:extLst>
   </p:cSld>

</xml_diff>

<commit_message>
Aula 7 - Final
</commit_message>
<xml_diff>
--- a/doc/NUBOOT-MOD4-DEVOPS-SERVICES.pptx
+++ b/doc/NUBOOT-MOD4-DEVOPS-SERVICES.pptx
@@ -5,7 +5,7 @@
     <p:sldMasterId id="2147483648" r:id="rId1"/>
   </p:sldMasterIdLst>
   <p:notesMasterIdLst>
-    <p:notesMasterId r:id="rId34"/>
+    <p:notesMasterId r:id="rId35"/>
   </p:notesMasterIdLst>
   <p:sldIdLst>
     <p:sldId id="256" r:id="rId2"/>
@@ -38,8 +38,9 @@
     <p:sldId id="312" r:id="rId29"/>
     <p:sldId id="313" r:id="rId30"/>
     <p:sldId id="314" r:id="rId31"/>
-    <p:sldId id="315" r:id="rId32"/>
-    <p:sldId id="316" r:id="rId33"/>
+    <p:sldId id="317" r:id="rId32"/>
+    <p:sldId id="315" r:id="rId33"/>
+    <p:sldId id="316" r:id="rId34"/>
   </p:sldIdLst>
   <p:sldSz cx="12192000" cy="6858000"/>
   <p:notesSz cx="6858000" cy="9144000"/>
@@ -201,6 +202,7 @@
           <p14:sldIdLst>
             <p14:sldId id="313"/>
             <p14:sldId id="314"/>
+            <p14:sldId id="317"/>
             <p14:sldId id="315"/>
             <p14:sldId id="316"/>
           </p14:sldIdLst>
@@ -299,7 +301,7 @@
           <a:p>
             <a:fld id="{290A6CB2-1C58-D84E-B07B-B5770D071A49}" type="datetimeFigureOut">
               <a:rPr lang="en-BR" smtClean="0"/>
-              <a:t>12/07/23</a:t>
+              <a:t>14/07/23</a:t>
             </a:fld>
             <a:endParaRPr lang="en-BR"/>
           </a:p>
@@ -868,7 +870,7 @@
           <a:p>
             <a:fld id="{9AB3A824-1A51-4B26-AD58-A6D8E14F6C04}" type="datetimeFigureOut">
               <a:rPr lang="en-US"/>
-              <a:t>7/12/23</a:t>
+              <a:t>7/14/23</a:t>
             </a:fld>
             <a:endParaRPr lang="en-US"/>
           </a:p>
@@ -1202,7 +1204,7 @@
           <a:p>
             <a:fld id="{D857E33E-8B18-4087-B112-809917729534}" type="datetimeFigureOut">
               <a:rPr lang="en-US"/>
-              <a:t>7/12/23</a:t>
+              <a:t>7/14/23</a:t>
             </a:fld>
             <a:endParaRPr lang="en-US"/>
           </a:p>
@@ -1504,7 +1506,7 @@
           <a:p>
             <a:fld id="{D3FFE419-2371-464F-8239-3959401C3561}" type="datetimeFigureOut">
               <a:rPr lang="en-US"/>
-              <a:t>7/12/23</a:t>
+              <a:t>7/14/23</a:t>
             </a:fld>
             <a:endParaRPr lang="en-US"/>
           </a:p>
@@ -1751,7 +1753,7 @@
           <a:p>
             <a:fld id="{97D162C4-EDD9-4389-A98B-B87ECEA2A816}" type="datetimeFigureOut">
               <a:rPr lang="en-US"/>
-              <a:t>7/12/23</a:t>
+              <a:t>7/14/23</a:t>
             </a:fld>
             <a:endParaRPr lang="en-US"/>
           </a:p>
@@ -2158,7 +2160,7 @@
           <a:p>
             <a:fld id="{3E5059C3-6A89-4494-99FF-5A4D6FFD50EB}" type="datetimeFigureOut">
               <a:rPr lang="en-US"/>
-              <a:t>7/12/23</a:t>
+              <a:t>7/14/23</a:t>
             </a:fld>
             <a:endParaRPr lang="en-US"/>
           </a:p>
@@ -2472,7 +2474,7 @@
           <a:p>
             <a:fld id="{CA954B2F-12DE-47F5-8894-472B206D2E1E}" type="datetimeFigureOut">
               <a:rPr lang="en-US"/>
-              <a:t>7/12/23</a:t>
+              <a:t>7/14/23</a:t>
             </a:fld>
             <a:endParaRPr lang="en-US"/>
           </a:p>
@@ -3016,7 +3018,7 @@
           <a:p>
             <a:fld id="{3F30E46F-7819-4ACF-B48B-48222C2ACC88}" type="datetimeFigureOut">
               <a:rPr lang="en-US"/>
-              <a:t>7/12/23</a:t>
+              <a:t>7/14/23</a:t>
             </a:fld>
             <a:endParaRPr lang="en-US"/>
           </a:p>
@@ -3211,7 +3213,7 @@
           <a:p>
             <a:fld id="{1FAF3416-4057-4DAA-829D-4CA07428D088}" type="datetimeFigureOut">
               <a:rPr lang="en-US"/>
-              <a:t>7/12/23</a:t>
+              <a:t>7/14/23</a:t>
             </a:fld>
             <a:endParaRPr lang="en-US"/>
           </a:p>
@@ -3424,7 +3426,7 @@
           <a:p>
             <a:fld id="{921D9284-D300-4297-87F7-E791DCC15DB1}" type="datetimeFigureOut">
               <a:rPr lang="en-US"/>
-              <a:t>7/12/23</a:t>
+              <a:t>7/14/23</a:t>
             </a:fld>
             <a:endParaRPr lang="en-US"/>
           </a:p>
@@ -3793,7 +3795,7 @@
           <a:p>
             <a:fld id="{37D525BB-DA17-4BA0-B3C8-3AC3ABC827E6}" type="datetimeFigureOut">
               <a:rPr lang="en-US"/>
-              <a:t>7/12/23</a:t>
+              <a:t>7/14/23</a:t>
             </a:fld>
             <a:endParaRPr lang="en-US"/>
           </a:p>
@@ -4195,7 +4197,7 @@
           <a:p>
             <a:fld id="{B16C4C9A-3960-41CF-A4E9-2A8FB932454B}" type="datetimeFigureOut">
               <a:rPr lang="en-US"/>
-              <a:t>7/12/23</a:t>
+              <a:t>7/14/23</a:t>
             </a:fld>
             <a:endParaRPr lang="en-US"/>
           </a:p>
@@ -4506,7 +4508,7 @@
           <a:p>
             <a:fld id="{3CBC1C18-307B-4F68-A007-B5B542270E8D}" type="datetimeFigureOut">
               <a:rPr lang="en-US"/>
-              <a:t>7/12/23</a:t>
+              <a:t>7/14/23</a:t>
             </a:fld>
             <a:endParaRPr lang="en-US"/>
           </a:p>
@@ -8961,7 +8963,7 @@
           <a:p>
             <a:r>
               <a:rPr lang="en-BR" dirty="0"/>
-              <a:t>Minio</a:t>
+              <a:t>MinIO</a:t>
             </a:r>
           </a:p>
           <a:p>
@@ -9190,6 +9192,110 @@
           <p:cNvPr id="2" name="Title 1">
             <a:extLst>
               <a:ext uri="{FF2B5EF4-FFF2-40B4-BE49-F238E27FC236}">
+                <a16:creationId xmlns:a16="http://schemas.microsoft.com/office/drawing/2014/main" id="{2091AF6A-A15E-B712-91DA-60960E606AAE}"/>
+              </a:ext>
+            </a:extLst>
+          </p:cNvPr>
+          <p:cNvSpPr>
+            <a:spLocks noGrp="1"/>
+          </p:cNvSpPr>
+          <p:nvPr>
+            <p:ph type="title"/>
+          </p:nvPr>
+        </p:nvSpPr>
+        <p:spPr/>
+        <p:txBody>
+          <a:bodyPr/>
+          <a:lstStyle/>
+          <a:p>
+            <a:r>
+              <a:rPr lang="en-BR" dirty="0"/>
+              <a:t>Casos de Uso	</a:t>
+            </a:r>
+          </a:p>
+        </p:txBody>
+      </p:sp>
+      <p:sp>
+        <p:nvSpPr>
+          <p:cNvPr id="3" name="Content Placeholder 2">
+            <a:extLst>
+              <a:ext uri="{FF2B5EF4-FFF2-40B4-BE49-F238E27FC236}">
+                <a16:creationId xmlns:a16="http://schemas.microsoft.com/office/drawing/2014/main" id="{85EB8EC4-F889-5174-0A67-171524B1B990}"/>
+              </a:ext>
+            </a:extLst>
+          </p:cNvPr>
+          <p:cNvSpPr>
+            <a:spLocks noGrp="1"/>
+          </p:cNvSpPr>
+          <p:nvPr>
+            <p:ph idx="1"/>
+          </p:nvPr>
+        </p:nvSpPr>
+        <p:spPr/>
+        <p:txBody>
+          <a:bodyPr/>
+          <a:lstStyle/>
+          <a:p>
+            <a:r>
+              <a:rPr lang="en-BR" dirty="0"/>
+              <a:t>Attachments</a:t>
+            </a:r>
+          </a:p>
+          <a:p>
+            <a:r>
+              <a:rPr lang="en-BR" dirty="0"/>
+              <a:t>Websites estáticos</a:t>
+            </a:r>
+          </a:p>
+          <a:p>
+            <a:r>
+              <a:rPr lang="en-BR" dirty="0"/>
+              <a:t>Data Pipelines</a:t>
+            </a:r>
+          </a:p>
+          <a:p>
+            <a:r>
+              <a:rPr lang="en-BR" dirty="0"/>
+              <a:t>Analytics Distribuido</a:t>
+            </a:r>
+          </a:p>
+        </p:txBody>
+      </p:sp>
+    </p:spTree>
+    <p:extLst>
+      <p:ext uri="{BB962C8B-B14F-4D97-AF65-F5344CB8AC3E}">
+        <p14:creationId xmlns:p14="http://schemas.microsoft.com/office/powerpoint/2010/main" val="438800533"/>
+      </p:ext>
+    </p:extLst>
+  </p:cSld>
+  <p:clrMapOvr>
+    <a:masterClrMapping/>
+  </p:clrMapOvr>
+</p:sld>
+</file>
+
+<file path=ppt/slides/slide32.xml><?xml version="1.0" encoding="utf-8"?>
+<p:sld xmlns:a="http://schemas.openxmlformats.org/drawingml/2006/main" xmlns:r="http://schemas.openxmlformats.org/officeDocument/2006/relationships" xmlns:p="http://schemas.openxmlformats.org/presentationml/2006/main">
+  <p:cSld>
+    <p:spTree>
+      <p:nvGrpSpPr>
+        <p:cNvPr id="1" name=""/>
+        <p:cNvGrpSpPr/>
+        <p:nvPr/>
+      </p:nvGrpSpPr>
+      <p:grpSpPr>
+        <a:xfrm>
+          <a:off x="0" y="0"/>
+          <a:ext cx="0" cy="0"/>
+          <a:chOff x="0" y="0"/>
+          <a:chExt cx="0" cy="0"/>
+        </a:xfrm>
+      </p:grpSpPr>
+      <p:sp>
+        <p:nvSpPr>
+          <p:cNvPr id="2" name="Title 1">
+            <a:extLst>
+              <a:ext uri="{FF2B5EF4-FFF2-40B4-BE49-F238E27FC236}">
                 <a16:creationId xmlns:a16="http://schemas.microsoft.com/office/drawing/2014/main" id="{CC31A422-00A6-F19A-ACA6-F38F1FE60E98}"/>
               </a:ext>
             </a:extLst>
@@ -9266,7 +9372,7 @@
 </p:sld>
 </file>
 
-<file path=ppt/slides/slide32.xml><?xml version="1.0" encoding="utf-8"?>
+<file path=ppt/slides/slide33.xml><?xml version="1.0" encoding="utf-8"?>
 <p:sld xmlns:a="http://schemas.openxmlformats.org/drawingml/2006/main" xmlns:r="http://schemas.openxmlformats.org/officeDocument/2006/relationships" xmlns:p="http://schemas.openxmlformats.org/presentationml/2006/main">
   <p:cSld>
     <p:spTree>

</xml_diff>